<commit_message>
Removed content to match (silly) 6 minute limit
</commit_message>
<xml_diff>
--- a/10-Final_Presentation/Presentation.pptx
+++ b/10-Final_Presentation/Presentation.pptx
@@ -298,7 +298,7 @@
           <a:p>
             <a:fld id="{829A253D-B4AC-4BD7-A6C8-D616E8949AF6}" type="datetimeFigureOut">
               <a:rPr lang="en-GB" smtClean="0"/>
-              <a:t>01/05/2024</a:t>
+              <a:t>06/05/2024</a:t>
             </a:fld>
             <a:endParaRPr lang="en-GB"/>
           </a:p>
@@ -498,7 +498,7 @@
           <a:p>
             <a:fld id="{829A253D-B4AC-4BD7-A6C8-D616E8949AF6}" type="datetimeFigureOut">
               <a:rPr lang="en-GB" smtClean="0"/>
-              <a:t>01/05/2024</a:t>
+              <a:t>06/05/2024</a:t>
             </a:fld>
             <a:endParaRPr lang="en-GB"/>
           </a:p>
@@ -708,7 +708,7 @@
           <a:p>
             <a:fld id="{829A253D-B4AC-4BD7-A6C8-D616E8949AF6}" type="datetimeFigureOut">
               <a:rPr lang="en-GB" smtClean="0"/>
-              <a:t>01/05/2024</a:t>
+              <a:t>06/05/2024</a:t>
             </a:fld>
             <a:endParaRPr lang="en-GB"/>
           </a:p>
@@ -908,7 +908,7 @@
           <a:p>
             <a:fld id="{829A253D-B4AC-4BD7-A6C8-D616E8949AF6}" type="datetimeFigureOut">
               <a:rPr lang="en-GB" smtClean="0"/>
-              <a:t>01/05/2024</a:t>
+              <a:t>06/05/2024</a:t>
             </a:fld>
             <a:endParaRPr lang="en-GB"/>
           </a:p>
@@ -1184,7 +1184,7 @@
           <a:p>
             <a:fld id="{829A253D-B4AC-4BD7-A6C8-D616E8949AF6}" type="datetimeFigureOut">
               <a:rPr lang="en-GB" smtClean="0"/>
-              <a:t>01/05/2024</a:t>
+              <a:t>06/05/2024</a:t>
             </a:fld>
             <a:endParaRPr lang="en-GB"/>
           </a:p>
@@ -1452,7 +1452,7 @@
           <a:p>
             <a:fld id="{829A253D-B4AC-4BD7-A6C8-D616E8949AF6}" type="datetimeFigureOut">
               <a:rPr lang="en-GB" smtClean="0"/>
-              <a:t>01/05/2024</a:t>
+              <a:t>06/05/2024</a:t>
             </a:fld>
             <a:endParaRPr lang="en-GB"/>
           </a:p>
@@ -1867,7 +1867,7 @@
           <a:p>
             <a:fld id="{829A253D-B4AC-4BD7-A6C8-D616E8949AF6}" type="datetimeFigureOut">
               <a:rPr lang="en-GB" smtClean="0"/>
-              <a:t>01/05/2024</a:t>
+              <a:t>06/05/2024</a:t>
             </a:fld>
             <a:endParaRPr lang="en-GB"/>
           </a:p>
@@ -2009,7 +2009,7 @@
           <a:p>
             <a:fld id="{829A253D-B4AC-4BD7-A6C8-D616E8949AF6}" type="datetimeFigureOut">
               <a:rPr lang="en-GB" smtClean="0"/>
-              <a:t>01/05/2024</a:t>
+              <a:t>06/05/2024</a:t>
             </a:fld>
             <a:endParaRPr lang="en-GB"/>
           </a:p>
@@ -2122,7 +2122,7 @@
           <a:p>
             <a:fld id="{829A253D-B4AC-4BD7-A6C8-D616E8949AF6}" type="datetimeFigureOut">
               <a:rPr lang="en-GB" smtClean="0"/>
-              <a:t>01/05/2024</a:t>
+              <a:t>06/05/2024</a:t>
             </a:fld>
             <a:endParaRPr lang="en-GB"/>
           </a:p>
@@ -2435,7 +2435,7 @@
           <a:p>
             <a:fld id="{829A253D-B4AC-4BD7-A6C8-D616E8949AF6}" type="datetimeFigureOut">
               <a:rPr lang="en-GB" smtClean="0"/>
-              <a:t>01/05/2024</a:t>
+              <a:t>06/05/2024</a:t>
             </a:fld>
             <a:endParaRPr lang="en-GB"/>
           </a:p>
@@ -2724,7 +2724,7 @@
           <a:p>
             <a:fld id="{829A253D-B4AC-4BD7-A6C8-D616E8949AF6}" type="datetimeFigureOut">
               <a:rPr lang="en-GB" smtClean="0"/>
-              <a:t>01/05/2024</a:t>
+              <a:t>06/05/2024</a:t>
             </a:fld>
             <a:endParaRPr lang="en-GB"/>
           </a:p>
@@ -2967,7 +2967,7 @@
           <a:p>
             <a:fld id="{829A253D-B4AC-4BD7-A6C8-D616E8949AF6}" type="datetimeFigureOut">
               <a:rPr lang="en-GB" smtClean="0"/>
-              <a:t>01/05/2024</a:t>
+              <a:t>06/05/2024</a:t>
             </a:fld>
             <a:endParaRPr lang="en-GB"/>
           </a:p>
@@ -4913,15 +4913,6 @@
                 <a:latin typeface="Lucida Sans Unicode" panose="020B0602030504020204" pitchFamily="34" charset="0"/>
                 <a:cs typeface="Lucida Sans Unicode" panose="020B0602030504020204" pitchFamily="34" charset="0"/>
               </a:rPr>
-              <a:t>Following a mobile-first design approach, media queries were used to affect the styling and layout of the page with progressively increasing viewport sizes.</a:t>
-            </a:r>
-          </a:p>
-          <a:p>
-            <a:r>
-              <a:rPr lang="en-GB" sz="2000" dirty="0">
-                <a:latin typeface="Lucida Sans Unicode" panose="020B0602030504020204" pitchFamily="34" charset="0"/>
-                <a:cs typeface="Lucida Sans Unicode" panose="020B0602030504020204" pitchFamily="34" charset="0"/>
-              </a:rPr>
               <a:t>Prioritising smaller, mobile screens – which the default styling does – improves the performance of the web application when it runs on these devices, which often have limited bandwidth when compared to larger devices. </a:t>
             </a:r>
             <a:endParaRPr lang="en-GB" sz="3200" dirty="0">
@@ -5456,18 +5447,6 @@
           <a:bodyPr/>
           <a:lstStyle/>
           <a:p>
-            <a:r>
-              <a:rPr lang="en-GB" sz="1800" dirty="0">
-                <a:solidFill>
-                  <a:schemeClr val="tx1"/>
-                </a:solidFill>
-                <a:effectLst/>
-                <a:latin typeface="Lucida Sans Unicode" panose="020B0602030504020204" pitchFamily="34" charset="0"/>
-                <a:ea typeface="Aptos" panose="020B0004020202020204" pitchFamily="34" charset="0"/>
-                <a:cs typeface="Lucida Sans Unicode" panose="020B0602030504020204" pitchFamily="34" charset="0"/>
-              </a:rPr>
-              <a:t> By using flex containers, the arrangement of elements dynamically changes based on the available screen size. Media Queries are used to apply specific styling rulesets based on the current screen compared with the minimum targeted width thresholds.</a:t>
-            </a:r>
             <a:endParaRPr lang="en-GB" dirty="0">
               <a:solidFill>
                 <a:schemeClr val="tx1"/>
@@ -5759,18 +5738,15 @@
                 <a:spcPts val="800"/>
               </a:spcAft>
             </a:pPr>
-            <a:r>
-              <a:rPr lang="en-GB" sz="1800" dirty="0">
-                <a:solidFill>
-                  <a:schemeClr val="tx1"/>
-                </a:solidFill>
-                <a:effectLst/>
-                <a:latin typeface="Lucida Sans Unicode" panose="020B0602030504020204" pitchFamily="34" charset="0"/>
-                <a:ea typeface="Aptos" panose="020B0004020202020204" pitchFamily="34" charset="0"/>
-                <a:cs typeface="Lucida Sans Unicode" panose="020B0602030504020204" pitchFamily="34" charset="0"/>
-              </a:rPr>
-              <a:t>These diagrams show the paths the user may follow to interact with the web application.</a:t>
-            </a:r>
+            <a:endParaRPr lang="en-GB" sz="1800" dirty="0">
+              <a:solidFill>
+                <a:schemeClr val="tx1"/>
+              </a:solidFill>
+              <a:effectLst/>
+              <a:latin typeface="Lucida Sans Unicode" panose="020B0602030504020204" pitchFamily="34" charset="0"/>
+              <a:ea typeface="Aptos" panose="020B0004020202020204" pitchFamily="34" charset="0"/>
+              <a:cs typeface="Lucida Sans Unicode" panose="020B0602030504020204" pitchFamily="34" charset="0"/>
+            </a:endParaRPr>
           </a:p>
         </p:txBody>
       </p:sp>
@@ -6093,18 +6069,15 @@
                 <a:spcPts val="800"/>
               </a:spcAft>
             </a:pPr>
-            <a:r>
-              <a:rPr lang="en-GB" sz="1800" dirty="0">
-                <a:solidFill>
-                  <a:schemeClr val="tx1"/>
-                </a:solidFill>
-                <a:effectLst/>
-                <a:latin typeface="Lucida Sans Unicode" panose="020B0602030504020204" pitchFamily="34" charset="0"/>
-                <a:ea typeface="Aptos" panose="020B0004020202020204" pitchFamily="34" charset="0"/>
-                <a:cs typeface="Lucida Sans Unicode" panose="020B0602030504020204" pitchFamily="34" charset="0"/>
-              </a:rPr>
-              <a:t>These diagrams show how the front end of the web application interacts with the client-side JavaScript processes and the browsers Local Storage database.</a:t>
-            </a:r>
+            <a:endParaRPr lang="en-GB" sz="1800" dirty="0">
+              <a:solidFill>
+                <a:schemeClr val="tx1"/>
+              </a:solidFill>
+              <a:effectLst/>
+              <a:latin typeface="Lucida Sans Unicode" panose="020B0602030504020204" pitchFamily="34" charset="0"/>
+              <a:ea typeface="Aptos" panose="020B0004020202020204" pitchFamily="34" charset="0"/>
+              <a:cs typeface="Lucida Sans Unicode" panose="020B0602030504020204" pitchFamily="34" charset="0"/>
+            </a:endParaRPr>
           </a:p>
         </p:txBody>
       </p:sp>
@@ -7132,7 +7105,7 @@
                 <a:ea typeface="Aptos" panose="020B0004020202020204" pitchFamily="34" charset="0"/>
                 <a:cs typeface="Lucida Sans Unicode" panose="020B0602030504020204" pitchFamily="34" charset="0"/>
               </a:rPr>
-              <a:t>The issue arose as at the time the application was using a local JSON file to store item entries, which, using the Fetch API could not be written to by the browser for security reasons – only read.</a:t>
+              <a:t>The issue arose as at the time the application was using a local JSON file to store item entries, which using the Fetch API could not be written to by the browser for security reasons – only read.</a:t>
             </a:r>
           </a:p>
           <a:p>

</xml_diff>